<commit_message>
more causal inference slide updates
</commit_message>
<xml_diff>
--- a/14 - Causality and Field Validation/causal inference.pptx
+++ b/14 - Causality and Field Validation/causal inference.pptx
@@ -11,9 +11,9 @@
     <p:sldId id="256" r:id="rId2"/>
     <p:sldId id="257" r:id="rId3"/>
     <p:sldId id="488" r:id="rId4"/>
-    <p:sldId id="323" r:id="rId5"/>
-    <p:sldId id="258" r:id="rId6"/>
-    <p:sldId id="259" r:id="rId7"/>
+    <p:sldId id="259" r:id="rId5"/>
+    <p:sldId id="323" r:id="rId6"/>
+    <p:sldId id="258" r:id="rId7"/>
     <p:sldId id="274" r:id="rId8"/>
     <p:sldId id="260" r:id="rId9"/>
     <p:sldId id="261" r:id="rId10"/>
@@ -272,7 +272,7 @@
       <p15:sldGuideLst xmlns:p15="http://schemas.microsoft.com/office/powerpoint/2012/main"/>
     </p:ext>
     <p:ext uri="http://customooxmlschemas.google.com/">
-      <go:slidesCustomData xmlns="" xmlns:mc="http://schemas.openxmlformats.org/markup-compatibility/2006" xmlns:mv="urn:schemas-microsoft-com:mac:vml" xmlns:c="http://schemas.openxmlformats.org/drawingml/2006/chart" xmlns:dgm="http://schemas.openxmlformats.org/drawingml/2006/diagram" xmlns:o="urn:schemas-microsoft-com:office:office" xmlns:v="urn:schemas-microsoft-com:vml" xmlns:pvml="urn:schemas-microsoft-com:office:powerpoint" xmlns:com="http://schemas.openxmlformats.org/drawingml/2006/compatibility" xmlns:p14="http://schemas.microsoft.com/office/powerpoint/2010/main" xmlns:p15="http://schemas.microsoft.com/office/powerpoint/2012/main" xmlns:go="http://customooxmlschemas.google.com/" r:id="rId30" roundtripDataSignature="AMtx7mgWqGpmJnm2LhSO/E7EgiMMs26KqA=="/>
+      <go:slidesCustomData xmlns:go="http://customooxmlschemas.google.com/" xmlns:p15="http://schemas.microsoft.com/office/powerpoint/2012/main" xmlns:p14="http://schemas.microsoft.com/office/powerpoint/2010/main" xmlns:com="http://schemas.openxmlformats.org/drawingml/2006/compatibility" xmlns:pvml="urn:schemas-microsoft-com:office:powerpoint" xmlns:v="urn:schemas-microsoft-com:vml" xmlns:o="urn:schemas-microsoft-com:office:office" xmlns:dgm="http://schemas.openxmlformats.org/drawingml/2006/diagram" xmlns:c="http://schemas.openxmlformats.org/drawingml/2006/chart" xmlns:mv="urn:schemas-microsoft-com:mac:vml" xmlns:mc="http://schemas.openxmlformats.org/markup-compatibility/2006" xmlns="" r:id="rId30" roundtripDataSignature="AMtx7mgWqGpmJnm2LhSO/E7EgiMMs26KqA=="/>
     </p:ext>
   </p:extLst>
 </p:presentation>
@@ -8835,7 +8835,7 @@
   <p:cSld>
     <p:spTree>
       <p:nvGrpSpPr>
-        <p:cNvPr id="1" name="Shape 50"/>
+        <p:cNvPr id="1" name="Shape 126"/>
         <p:cNvGrpSpPr/>
         <p:nvPr/>
       </p:nvGrpSpPr>
@@ -8849,7 +8849,7 @@
       </p:grpSpPr>
       <p:sp>
         <p:nvSpPr>
-          <p:cNvPr id="51" name="Google Shape;51;p24:notes"/>
+          <p:cNvPr id="127" name="Google Shape;127;p25:notes"/>
           <p:cNvSpPr txBox="1">
             <a:spLocks noGrp="1"/>
           </p:cNvSpPr>
@@ -8887,7 +8887,7 @@
       </p:sp>
       <p:sp>
         <p:nvSpPr>
-          <p:cNvPr id="52" name="Google Shape;52;p24:notes"/>
+          <p:cNvPr id="128" name="Google Shape;128;p25:notes"/>
           <p:cNvSpPr>
             <a:spLocks noGrp="1" noRot="1" noChangeAspect="1"/>
           </p:cNvSpPr>
@@ -8939,7 +8939,7 @@
   <p:cSld>
     <p:spTree>
       <p:nvGrpSpPr>
-        <p:cNvPr id="1" name="Shape 126"/>
+        <p:cNvPr id="1" name="Shape 50"/>
         <p:cNvGrpSpPr/>
         <p:nvPr/>
       </p:nvGrpSpPr>
@@ -8953,7 +8953,7 @@
       </p:grpSpPr>
       <p:sp>
         <p:nvSpPr>
-          <p:cNvPr id="127" name="Google Shape;127;p25:notes"/>
+          <p:cNvPr id="51" name="Google Shape;51;p24:notes"/>
           <p:cNvSpPr txBox="1">
             <a:spLocks noGrp="1"/>
           </p:cNvSpPr>
@@ -8991,7 +8991,7 @@
       </p:sp>
       <p:sp>
         <p:nvSpPr>
-          <p:cNvPr id="128" name="Google Shape;128;p25:notes"/>
+          <p:cNvPr id="52" name="Google Shape;52;p24:notes"/>
           <p:cNvSpPr>
             <a:spLocks noGrp="1" noRot="1" noChangeAspect="1"/>
           </p:cNvSpPr>
@@ -18127,19 +18127,19 @@
               <a:rPr lang="en-US" dirty="0"/>
               <a:t>Causal Inference 001</a:t>
             </a:r>
+            <a:br>
+              <a:rPr lang="en-US" dirty="0"/>
+            </a:br>
             <a:endParaRPr dirty="0"/>
           </a:p>
           <a:p>
-            <a:pPr marL="457200" lvl="0" indent="-381000" algn="l" rtl="0">
+            <a:pPr lvl="1" indent="-381000">
               <a:lnSpc>
                 <a:spcPct val="100000"/>
               </a:lnSpc>
               <a:spcBef>
                 <a:spcPts val="0"/>
               </a:spcBef>
-              <a:spcAft>
-                <a:spcPts val="0"/>
-              </a:spcAft>
               <a:buSzPts val="2400"/>
               <a:buChar char="●"/>
             </a:pPr>
@@ -18150,17 +18150,13 @@
             <a:endParaRPr dirty="0"/>
           </a:p>
           <a:p>
-            <a:pPr marL="914400" lvl="1" indent="-349250" algn="l" rtl="0">
+            <a:pPr lvl="2">
               <a:lnSpc>
                 <a:spcPct val="100000"/>
               </a:lnSpc>
               <a:spcBef>
                 <a:spcPts val="0"/>
               </a:spcBef>
-              <a:spcAft>
-                <a:spcPts val="0"/>
-              </a:spcAft>
-              <a:buSzPts val="1900"/>
               <a:buChar char="○"/>
             </a:pPr>
             <a:r>
@@ -18170,36 +18166,32 @@
             <a:endParaRPr dirty="0"/>
           </a:p>
           <a:p>
-            <a:pPr marL="914400" lvl="1" indent="-349250" algn="l" rtl="0">
+            <a:pPr lvl="2">
               <a:lnSpc>
                 <a:spcPct val="100000"/>
               </a:lnSpc>
               <a:spcBef>
                 <a:spcPts val="0"/>
               </a:spcBef>
-              <a:spcAft>
-                <a:spcPts val="0"/>
-              </a:spcAft>
-              <a:buSzPts val="1900"/>
               <a:buChar char="○"/>
             </a:pPr>
             <a:r>
               <a:rPr lang="en-US" dirty="0"/>
               <a:t>Examples</a:t>
             </a:r>
+            <a:br>
+              <a:rPr lang="en-US" dirty="0"/>
+            </a:br>
             <a:endParaRPr dirty="0"/>
           </a:p>
           <a:p>
-            <a:pPr marL="457200" lvl="0" indent="-381000" algn="l" rtl="0">
+            <a:pPr lvl="1" indent="-381000">
               <a:lnSpc>
                 <a:spcPct val="100000"/>
               </a:lnSpc>
               <a:spcBef>
                 <a:spcPts val="0"/>
               </a:spcBef>
-              <a:spcAft>
-                <a:spcPts val="0"/>
-              </a:spcAft>
               <a:buSzPts val="2400"/>
               <a:buChar char="●"/>
             </a:pPr>
@@ -18210,17 +18202,13 @@
             <a:endParaRPr dirty="0"/>
           </a:p>
           <a:p>
-            <a:pPr marL="914400" lvl="1" indent="-349250" algn="l" rtl="0">
+            <a:pPr lvl="2">
               <a:lnSpc>
                 <a:spcPct val="100000"/>
               </a:lnSpc>
               <a:spcBef>
                 <a:spcPts val="0"/>
               </a:spcBef>
-              <a:spcAft>
-                <a:spcPts val="0"/>
-              </a:spcAft>
-              <a:buSzPts val="1900"/>
               <a:buChar char="○"/>
             </a:pPr>
             <a:r>
@@ -18230,17 +18218,13 @@
             <a:endParaRPr dirty="0"/>
           </a:p>
           <a:p>
-            <a:pPr marL="1371600" lvl="2" indent="-349250" algn="l" rtl="0">
+            <a:pPr lvl="3">
               <a:lnSpc>
                 <a:spcPct val="100000"/>
               </a:lnSpc>
               <a:spcBef>
                 <a:spcPts val="0"/>
               </a:spcBef>
-              <a:spcAft>
-                <a:spcPts val="0"/>
-              </a:spcAft>
-              <a:buSzPts val="1900"/>
               <a:buChar char="■"/>
             </a:pPr>
             <a:r>
@@ -18250,17 +18234,13 @@
             <a:endParaRPr dirty="0"/>
           </a:p>
           <a:p>
-            <a:pPr marL="1371600" lvl="2" indent="-349250" algn="l" rtl="0">
+            <a:pPr lvl="3">
               <a:lnSpc>
                 <a:spcPct val="100000"/>
               </a:lnSpc>
               <a:spcBef>
                 <a:spcPts val="0"/>
               </a:spcBef>
-              <a:spcAft>
-                <a:spcPts val="0"/>
-              </a:spcAft>
-              <a:buSzPts val="1900"/>
               <a:buChar char="■"/>
             </a:pPr>
             <a:r>
@@ -18270,17 +18250,13 @@
             <a:endParaRPr dirty="0"/>
           </a:p>
           <a:p>
-            <a:pPr marL="914400" lvl="1" indent="-349250" algn="l" rtl="0">
+            <a:pPr lvl="2">
               <a:lnSpc>
                 <a:spcPct val="100000"/>
               </a:lnSpc>
               <a:spcBef>
                 <a:spcPts val="0"/>
               </a:spcBef>
-              <a:spcAft>
-                <a:spcPts val="0"/>
-              </a:spcAft>
-              <a:buSzPts val="1900"/>
               <a:buChar char="○"/>
             </a:pPr>
             <a:r>
@@ -18290,17 +18266,13 @@
             <a:endParaRPr dirty="0"/>
           </a:p>
           <a:p>
-            <a:pPr marL="1371600" lvl="2" indent="-349250" algn="l" rtl="0">
+            <a:pPr lvl="3">
               <a:lnSpc>
                 <a:spcPct val="100000"/>
               </a:lnSpc>
               <a:spcBef>
                 <a:spcPts val="0"/>
               </a:spcBef>
-              <a:spcAft>
-                <a:spcPts val="0"/>
-              </a:spcAft>
-              <a:buSzPts val="1900"/>
               <a:buChar char="■"/>
             </a:pPr>
             <a:r>
@@ -18310,17 +18282,13 @@
             <a:endParaRPr dirty="0"/>
           </a:p>
           <a:p>
-            <a:pPr marL="1371600" lvl="2" indent="-349250" algn="l" rtl="0">
+            <a:pPr lvl="3">
               <a:lnSpc>
                 <a:spcPct val="100000"/>
               </a:lnSpc>
               <a:spcBef>
                 <a:spcPts val="0"/>
               </a:spcBef>
-              <a:spcAft>
-                <a:spcPts val="0"/>
-              </a:spcAft>
-              <a:buSzPts val="1900"/>
               <a:buChar char="■"/>
             </a:pPr>
             <a:r>
@@ -18455,10 +18423,10 @@
               <a:buChar char="●"/>
             </a:pPr>
             <a:r>
-              <a:rPr lang="en-US"/>
+              <a:rPr lang="en-US" dirty="0"/>
               <a:t>Standard “Randomized Controlled Trials”</a:t>
             </a:r>
-            <a:endParaRPr/>
+            <a:endParaRPr dirty="0"/>
           </a:p>
           <a:p>
             <a:pPr marL="76200" lvl="0" indent="0" algn="l" rtl="0">
@@ -18474,7 +18442,7 @@
               <a:buSzPts val="2400"/>
               <a:buNone/>
             </a:pPr>
-            <a:endParaRPr/>
+            <a:endParaRPr dirty="0"/>
           </a:p>
           <a:p>
             <a:pPr marL="457200" lvl="0" indent="-381000" algn="l" rtl="0">
@@ -18494,10 +18462,10 @@
               <a:buChar char="●"/>
             </a:pPr>
             <a:r>
-              <a:rPr lang="en-US"/>
+              <a:rPr lang="en-US" dirty="0"/>
               <a:t>Trial Design</a:t>
             </a:r>
-            <a:endParaRPr/>
+            <a:endParaRPr dirty="0"/>
           </a:p>
           <a:p>
             <a:pPr marL="914400" lvl="1" indent="-349250" algn="l" rtl="0">
@@ -18514,10 +18482,10 @@
               <a:buChar char="○"/>
             </a:pPr>
             <a:r>
-              <a:rPr lang="en-US"/>
+              <a:rPr lang="en-US" dirty="0"/>
               <a:t>Outcome</a:t>
             </a:r>
-            <a:endParaRPr/>
+            <a:endParaRPr dirty="0"/>
           </a:p>
           <a:p>
             <a:pPr marL="914400" lvl="1" indent="-349250" algn="l" rtl="0">
@@ -18534,10 +18502,10 @@
               <a:buChar char="○"/>
             </a:pPr>
             <a:r>
-              <a:rPr lang="en-US"/>
+              <a:rPr lang="en-US" dirty="0"/>
               <a:t>Sample size</a:t>
             </a:r>
-            <a:endParaRPr/>
+            <a:endParaRPr dirty="0"/>
           </a:p>
           <a:p>
             <a:pPr marL="1371600" lvl="2" indent="-349250" algn="l" rtl="0">
@@ -18554,10 +18522,10 @@
               <a:buChar char="■"/>
             </a:pPr>
             <a:r>
-              <a:rPr lang="en-US"/>
+              <a:rPr lang="en-US" dirty="0"/>
               <a:t>Power</a:t>
             </a:r>
-            <a:endParaRPr/>
+            <a:endParaRPr dirty="0"/>
           </a:p>
           <a:p>
             <a:pPr marL="914400" lvl="1" indent="-349250" algn="l" rtl="0">
@@ -18574,10 +18542,10 @@
               <a:buChar char="○"/>
             </a:pPr>
             <a:r>
-              <a:rPr lang="en-US"/>
+              <a:rPr lang="en-US" dirty="0"/>
               <a:t>Randomization</a:t>
             </a:r>
-            <a:endParaRPr/>
+            <a:endParaRPr dirty="0"/>
           </a:p>
           <a:p>
             <a:pPr marL="914400" lvl="1" indent="-228600" algn="l" rtl="0">
@@ -18593,27 +18561,15 @@
               <a:buSzPts val="1900"/>
               <a:buNone/>
             </a:pPr>
-            <a:endParaRPr/>
+            <a:endParaRPr dirty="0"/>
           </a:p>
           <a:p>
-            <a:pPr marL="107950" lvl="0" indent="0" algn="l" rtl="0">
-              <a:lnSpc>
-                <a:spcPct val="115000"/>
-              </a:lnSpc>
-              <a:spcBef>
-                <a:spcPts val="0"/>
-              </a:spcBef>
-              <a:spcAft>
-                <a:spcPts val="0"/>
-              </a:spcAft>
-              <a:buSzPts val="2400"/>
-              <a:buNone/>
-            </a:pPr>
+            <a:pPr marL="450850" indent="-342900"/>
             <a:r>
-              <a:rPr lang="en-US"/>
+              <a:rPr lang="en-US" dirty="0"/>
               <a:t>Ethical Concerns</a:t>
             </a:r>
-            <a:endParaRPr/>
+            <a:endParaRPr dirty="0"/>
           </a:p>
           <a:p>
             <a:pPr marL="914400" lvl="1" indent="-228600" algn="l" rtl="0">
@@ -18629,7 +18585,7 @@
               <a:buSzPts val="1900"/>
               <a:buNone/>
             </a:pPr>
-            <a:endParaRPr/>
+            <a:endParaRPr dirty="0"/>
           </a:p>
           <a:p>
             <a:pPr marL="914400" lvl="1" indent="-228600" algn="l" rtl="0">
@@ -18645,7 +18601,7 @@
               <a:buSzPts val="1900"/>
               <a:buNone/>
             </a:pPr>
-            <a:endParaRPr/>
+            <a:endParaRPr dirty="0"/>
           </a:p>
         </p:txBody>
       </p:sp>
@@ -21038,6 +20994,362 @@
   <p:cSld>
     <p:spTree>
       <p:nvGrpSpPr>
+        <p:cNvPr id="1" name="Shape 129"/>
+        <p:cNvGrpSpPr/>
+        <p:nvPr/>
+      </p:nvGrpSpPr>
+      <p:grpSpPr>
+        <a:xfrm>
+          <a:off x="0" y="0"/>
+          <a:ext cx="0" cy="0"/>
+          <a:chOff x="0" y="0"/>
+          <a:chExt cx="0" cy="0"/>
+        </a:xfrm>
+      </p:grpSpPr>
+      <p:sp>
+        <p:nvSpPr>
+          <p:cNvPr id="130" name="Google Shape;130;p25"/>
+          <p:cNvSpPr txBox="1">
+            <a:spLocks noGrp="1"/>
+          </p:cNvSpPr>
+          <p:nvPr>
+            <p:ph type="title"/>
+          </p:nvPr>
+        </p:nvSpPr>
+        <p:spPr>
+          <a:xfrm>
+            <a:off x="415600" y="86563"/>
+            <a:ext cx="11360700" cy="763500"/>
+          </a:xfrm>
+          <a:prstGeom prst="rect">
+            <a:avLst/>
+          </a:prstGeom>
+          <a:noFill/>
+          <a:ln>
+            <a:noFill/>
+          </a:ln>
+        </p:spPr>
+        <p:txBody>
+          <a:bodyPr spcFirstLastPara="1" wrap="square" lIns="121900" tIns="121900" rIns="121900" bIns="121900" anchor="t" anchorCtr="0">
+            <a:noAutofit/>
+          </a:bodyPr>
+          <a:lstStyle/>
+          <a:p>
+            <a:pPr marL="0" lvl="0" indent="0" algn="l" rtl="0">
+              <a:lnSpc>
+                <a:spcPct val="100000"/>
+              </a:lnSpc>
+              <a:spcBef>
+                <a:spcPts val="0"/>
+              </a:spcBef>
+              <a:spcAft>
+                <a:spcPts val="0"/>
+              </a:spcAft>
+              <a:buClr>
+                <a:srgbClr val="FFFFFF"/>
+              </a:buClr>
+              <a:buSzPts val="3700"/>
+              <a:buNone/>
+            </a:pPr>
+            <a:r>
+              <a:rPr lang="en-US"/>
+              <a:t>Project checklist</a:t>
+            </a:r>
+            <a:endParaRPr/>
+          </a:p>
+        </p:txBody>
+      </p:sp>
+      <p:sp>
+        <p:nvSpPr>
+          <p:cNvPr id="131" name="Google Shape;131;p25"/>
+          <p:cNvSpPr txBox="1">
+            <a:spLocks noGrp="1"/>
+          </p:cNvSpPr>
+          <p:nvPr>
+            <p:ph type="body" idx="1"/>
+          </p:nvPr>
+        </p:nvSpPr>
+        <p:spPr>
+          <a:xfrm>
+            <a:off x="415600" y="1536633"/>
+            <a:ext cx="11360700" cy="4555200"/>
+          </a:xfrm>
+          <a:prstGeom prst="rect">
+            <a:avLst/>
+          </a:prstGeom>
+          <a:noFill/>
+          <a:ln>
+            <a:noFill/>
+          </a:ln>
+        </p:spPr>
+        <p:txBody>
+          <a:bodyPr spcFirstLastPara="1" wrap="square" lIns="121900" tIns="121900" rIns="121900" bIns="121900" anchor="t" anchorCtr="0">
+            <a:noAutofit/>
+          </a:bodyPr>
+          <a:lstStyle/>
+          <a:p>
+            <a:pPr marL="0" lvl="0" indent="0" algn="l" rtl="0">
+              <a:lnSpc>
+                <a:spcPct val="115000"/>
+              </a:lnSpc>
+              <a:spcBef>
+                <a:spcPts val="0"/>
+              </a:spcBef>
+              <a:spcAft>
+                <a:spcPts val="0"/>
+              </a:spcAft>
+              <a:buSzPts val="2400"/>
+              <a:buChar char="●"/>
+            </a:pPr>
+            <a:r>
+              <a:rPr lang="en-US" dirty="0"/>
+              <a:t> Train Test Splits – make sure you’re using all of them</a:t>
+            </a:r>
+            <a:endParaRPr dirty="0"/>
+          </a:p>
+          <a:p>
+            <a:pPr marL="0" lvl="0" indent="0" algn="l" rtl="0">
+              <a:lnSpc>
+                <a:spcPct val="115000"/>
+              </a:lnSpc>
+              <a:spcBef>
+                <a:spcPts val="0"/>
+              </a:spcBef>
+              <a:spcAft>
+                <a:spcPts val="0"/>
+              </a:spcAft>
+              <a:buSzPts val="2400"/>
+              <a:buChar char="●"/>
+            </a:pPr>
+            <a:r>
+              <a:rPr lang="en-US" dirty="0"/>
+              <a:t> Features – make sure you have relevant features</a:t>
+            </a:r>
+            <a:endParaRPr dirty="0"/>
+          </a:p>
+          <a:p>
+            <a:pPr marL="914400" lvl="3" indent="-349250" algn="l" rtl="0">
+              <a:lnSpc>
+                <a:spcPct val="115000"/>
+              </a:lnSpc>
+              <a:spcBef>
+                <a:spcPts val="0"/>
+              </a:spcBef>
+              <a:spcAft>
+                <a:spcPts val="0"/>
+              </a:spcAft>
+              <a:buSzPts val="1900"/>
+              <a:buChar char="●"/>
+            </a:pPr>
+            <a:r>
+              <a:rPr lang="en-US" dirty="0"/>
+              <a:t>Imputation</a:t>
+            </a:r>
+            <a:endParaRPr dirty="0"/>
+          </a:p>
+          <a:p>
+            <a:pPr marL="914400" lvl="3" indent="-349250" algn="l" rtl="0">
+              <a:lnSpc>
+                <a:spcPct val="115000"/>
+              </a:lnSpc>
+              <a:spcBef>
+                <a:spcPts val="0"/>
+              </a:spcBef>
+              <a:spcAft>
+                <a:spcPts val="0"/>
+              </a:spcAft>
+              <a:buSzPts val="1900"/>
+              <a:buChar char="●"/>
+            </a:pPr>
+            <a:r>
+              <a:rPr lang="en-US" dirty="0"/>
+              <a:t>scaling</a:t>
+            </a:r>
+            <a:endParaRPr dirty="0"/>
+          </a:p>
+          <a:p>
+            <a:pPr marL="0" lvl="0" indent="0" algn="l" rtl="0">
+              <a:lnSpc>
+                <a:spcPct val="115000"/>
+              </a:lnSpc>
+              <a:spcBef>
+                <a:spcPts val="0"/>
+              </a:spcBef>
+              <a:spcAft>
+                <a:spcPts val="0"/>
+              </a:spcAft>
+              <a:buSzPts val="2400"/>
+              <a:buChar char="●"/>
+            </a:pPr>
+            <a:r>
+              <a:rPr lang="en-US" dirty="0"/>
+              <a:t> Models</a:t>
+            </a:r>
+            <a:endParaRPr dirty="0"/>
+          </a:p>
+          <a:p>
+            <a:pPr marL="914400" lvl="3" indent="-349250" algn="l" rtl="0">
+              <a:lnSpc>
+                <a:spcPct val="115000"/>
+              </a:lnSpc>
+              <a:spcBef>
+                <a:spcPts val="0"/>
+              </a:spcBef>
+              <a:spcAft>
+                <a:spcPts val="0"/>
+              </a:spcAft>
+              <a:buSzPts val="1900"/>
+              <a:buChar char="●"/>
+            </a:pPr>
+            <a:r>
+              <a:rPr lang="en-US" dirty="0"/>
+              <a:t>Make sure you have an appropriately large grid and model types</a:t>
+            </a:r>
+            <a:endParaRPr dirty="0"/>
+          </a:p>
+          <a:p>
+            <a:pPr marL="0" lvl="0" indent="0" algn="l" rtl="0">
+              <a:lnSpc>
+                <a:spcPct val="115000"/>
+              </a:lnSpc>
+              <a:spcBef>
+                <a:spcPts val="0"/>
+              </a:spcBef>
+              <a:spcAft>
+                <a:spcPts val="0"/>
+              </a:spcAft>
+              <a:buSzPts val="2400"/>
+              <a:buChar char="●"/>
+            </a:pPr>
+            <a:r>
+              <a:rPr lang="en-US" dirty="0"/>
+              <a:t> Model Selection</a:t>
+            </a:r>
+            <a:endParaRPr dirty="0"/>
+          </a:p>
+          <a:p>
+            <a:pPr marL="914400" lvl="3" indent="-349250" algn="l" rtl="0">
+              <a:lnSpc>
+                <a:spcPct val="115000"/>
+              </a:lnSpc>
+              <a:spcBef>
+                <a:spcPts val="0"/>
+              </a:spcBef>
+              <a:spcAft>
+                <a:spcPts val="0"/>
+              </a:spcAft>
+              <a:buSzPts val="1900"/>
+              <a:buChar char="●"/>
+            </a:pPr>
+            <a:r>
+              <a:rPr lang="en-US" dirty="0"/>
+              <a:t>Initial metric (sanity check with PR-k curve), and selection metric over time</a:t>
+            </a:r>
+            <a:endParaRPr dirty="0"/>
+          </a:p>
+          <a:p>
+            <a:pPr marL="0" lvl="0" indent="0" algn="l" rtl="0">
+              <a:lnSpc>
+                <a:spcPct val="115000"/>
+              </a:lnSpc>
+              <a:spcBef>
+                <a:spcPts val="0"/>
+              </a:spcBef>
+              <a:spcAft>
+                <a:spcPts val="0"/>
+              </a:spcAft>
+              <a:buSzPts val="2400"/>
+              <a:buChar char="●"/>
+            </a:pPr>
+            <a:r>
+              <a:rPr lang="en-US" dirty="0"/>
+              <a:t> Interpretability</a:t>
+            </a:r>
+            <a:endParaRPr dirty="0"/>
+          </a:p>
+          <a:p>
+            <a:pPr marL="914400" lvl="3" indent="-349250" algn="l" rtl="0">
+              <a:lnSpc>
+                <a:spcPct val="115000"/>
+              </a:lnSpc>
+              <a:spcBef>
+                <a:spcPts val="0"/>
+              </a:spcBef>
+              <a:spcAft>
+                <a:spcPts val="0"/>
+              </a:spcAft>
+              <a:buSzPts val="1900"/>
+              <a:buChar char="●"/>
+            </a:pPr>
+            <a:r>
+              <a:rPr lang="en-US" dirty="0"/>
+              <a:t>Feature </a:t>
+            </a:r>
+            <a:r>
+              <a:rPr lang="en-US" dirty="0" err="1"/>
+              <a:t>importances</a:t>
+            </a:r>
+            <a:r>
+              <a:rPr lang="en-US" dirty="0"/>
+              <a:t>, Cross-Tabs</a:t>
+            </a:r>
+            <a:endParaRPr dirty="0"/>
+          </a:p>
+          <a:p>
+            <a:pPr marL="0" lvl="0" indent="0" algn="l" rtl="0">
+              <a:lnSpc>
+                <a:spcPct val="115000"/>
+              </a:lnSpc>
+              <a:spcBef>
+                <a:spcPts val="0"/>
+              </a:spcBef>
+              <a:spcAft>
+                <a:spcPts val="0"/>
+              </a:spcAft>
+              <a:buSzPts val="2400"/>
+              <a:buChar char="●"/>
+            </a:pPr>
+            <a:r>
+              <a:rPr lang="en-US" dirty="0"/>
+              <a:t> Bias</a:t>
+            </a:r>
+            <a:endParaRPr dirty="0"/>
+          </a:p>
+          <a:p>
+            <a:pPr marL="914400" lvl="3" indent="-349250" algn="l" rtl="0">
+              <a:lnSpc>
+                <a:spcPct val="115000"/>
+              </a:lnSpc>
+              <a:spcBef>
+                <a:spcPts val="0"/>
+              </a:spcBef>
+              <a:spcAft>
+                <a:spcPts val="0"/>
+              </a:spcAft>
+              <a:buSzPts val="1900"/>
+              <a:buChar char="●"/>
+            </a:pPr>
+            <a:r>
+              <a:rPr lang="en-US" dirty="0"/>
+              <a:t>Protected Group and Bias Metric</a:t>
+            </a:r>
+            <a:endParaRPr dirty="0"/>
+          </a:p>
+        </p:txBody>
+      </p:sp>
+    </p:spTree>
+  </p:cSld>
+  <p:clrMapOvr>
+    <a:masterClrMapping/>
+  </p:clrMapOvr>
+</p:sld>
+</file>
+
+<file path=ppt/slides/slide5.xml><?xml version="1.0" encoding="utf-8"?>
+<p:sld xmlns:a="http://schemas.openxmlformats.org/drawingml/2006/main" xmlns:r="http://schemas.openxmlformats.org/officeDocument/2006/relationships" xmlns:p="http://schemas.openxmlformats.org/presentationml/2006/main">
+  <p:cSld>
+    <p:spTree>
+      <p:nvGrpSpPr>
         <p:cNvPr id="1" name=""/>
         <p:cNvGrpSpPr/>
         <p:nvPr/>
@@ -21162,7 +21474,7 @@
 </p:sld>
 </file>
 
-<file path=ppt/slides/slide5.xml><?xml version="1.0" encoding="utf-8"?>
+<file path=ppt/slides/slide6.xml><?xml version="1.0" encoding="utf-8"?>
 <p:sld xmlns:a="http://schemas.openxmlformats.org/drawingml/2006/main" xmlns:r="http://schemas.openxmlformats.org/officeDocument/2006/relationships" xmlns:p="http://schemas.openxmlformats.org/presentationml/2006/main" show="0">
   <p:cSld>
     <p:spTree>
@@ -24812,354 +25124,6 @@
 </p:sld>
 </file>
 
-<file path=ppt/slides/slide6.xml><?xml version="1.0" encoding="utf-8"?>
-<p:sld xmlns:a="http://schemas.openxmlformats.org/drawingml/2006/main" xmlns:r="http://schemas.openxmlformats.org/officeDocument/2006/relationships" xmlns:p="http://schemas.openxmlformats.org/presentationml/2006/main">
-  <p:cSld>
-    <p:spTree>
-      <p:nvGrpSpPr>
-        <p:cNvPr id="1" name="Shape 129"/>
-        <p:cNvGrpSpPr/>
-        <p:nvPr/>
-      </p:nvGrpSpPr>
-      <p:grpSpPr>
-        <a:xfrm>
-          <a:off x="0" y="0"/>
-          <a:ext cx="0" cy="0"/>
-          <a:chOff x="0" y="0"/>
-          <a:chExt cx="0" cy="0"/>
-        </a:xfrm>
-      </p:grpSpPr>
-      <p:sp>
-        <p:nvSpPr>
-          <p:cNvPr id="130" name="Google Shape;130;p25"/>
-          <p:cNvSpPr txBox="1">
-            <a:spLocks noGrp="1"/>
-          </p:cNvSpPr>
-          <p:nvPr>
-            <p:ph type="title"/>
-          </p:nvPr>
-        </p:nvSpPr>
-        <p:spPr>
-          <a:xfrm>
-            <a:off x="415600" y="86563"/>
-            <a:ext cx="11360700" cy="763500"/>
-          </a:xfrm>
-          <a:prstGeom prst="rect">
-            <a:avLst/>
-          </a:prstGeom>
-          <a:noFill/>
-          <a:ln>
-            <a:noFill/>
-          </a:ln>
-        </p:spPr>
-        <p:txBody>
-          <a:bodyPr spcFirstLastPara="1" wrap="square" lIns="121900" tIns="121900" rIns="121900" bIns="121900" anchor="t" anchorCtr="0">
-            <a:noAutofit/>
-          </a:bodyPr>
-          <a:lstStyle/>
-          <a:p>
-            <a:pPr marL="0" lvl="0" indent="0" algn="l" rtl="0">
-              <a:lnSpc>
-                <a:spcPct val="100000"/>
-              </a:lnSpc>
-              <a:spcBef>
-                <a:spcPts val="0"/>
-              </a:spcBef>
-              <a:spcAft>
-                <a:spcPts val="0"/>
-              </a:spcAft>
-              <a:buClr>
-                <a:srgbClr val="FFFFFF"/>
-              </a:buClr>
-              <a:buSzPts val="3700"/>
-              <a:buNone/>
-            </a:pPr>
-            <a:r>
-              <a:rPr lang="en-US"/>
-              <a:t>Project checklist</a:t>
-            </a:r>
-            <a:endParaRPr/>
-          </a:p>
-        </p:txBody>
-      </p:sp>
-      <p:sp>
-        <p:nvSpPr>
-          <p:cNvPr id="131" name="Google Shape;131;p25"/>
-          <p:cNvSpPr txBox="1">
-            <a:spLocks noGrp="1"/>
-          </p:cNvSpPr>
-          <p:nvPr>
-            <p:ph type="body" idx="1"/>
-          </p:nvPr>
-        </p:nvSpPr>
-        <p:spPr>
-          <a:xfrm>
-            <a:off x="415600" y="1536633"/>
-            <a:ext cx="11360700" cy="4555200"/>
-          </a:xfrm>
-          <a:prstGeom prst="rect">
-            <a:avLst/>
-          </a:prstGeom>
-          <a:noFill/>
-          <a:ln>
-            <a:noFill/>
-          </a:ln>
-        </p:spPr>
-        <p:txBody>
-          <a:bodyPr spcFirstLastPara="1" wrap="square" lIns="121900" tIns="121900" rIns="121900" bIns="121900" anchor="t" anchorCtr="0">
-            <a:noAutofit/>
-          </a:bodyPr>
-          <a:lstStyle/>
-          <a:p>
-            <a:pPr marL="0" lvl="0" indent="0" algn="l" rtl="0">
-              <a:lnSpc>
-                <a:spcPct val="115000"/>
-              </a:lnSpc>
-              <a:spcBef>
-                <a:spcPts val="0"/>
-              </a:spcBef>
-              <a:spcAft>
-                <a:spcPts val="0"/>
-              </a:spcAft>
-              <a:buSzPts val="2400"/>
-              <a:buChar char="●"/>
-            </a:pPr>
-            <a:r>
-              <a:rPr lang="en-US"/>
-              <a:t>Train Test Splits – make sure you’re using all of them</a:t>
-            </a:r>
-            <a:endParaRPr/>
-          </a:p>
-          <a:p>
-            <a:pPr marL="0" lvl="0" indent="0" algn="l" rtl="0">
-              <a:lnSpc>
-                <a:spcPct val="115000"/>
-              </a:lnSpc>
-              <a:spcBef>
-                <a:spcPts val="0"/>
-              </a:spcBef>
-              <a:spcAft>
-                <a:spcPts val="0"/>
-              </a:spcAft>
-              <a:buSzPts val="2400"/>
-              <a:buChar char="●"/>
-            </a:pPr>
-            <a:r>
-              <a:rPr lang="en-US"/>
-              <a:t>Features – make sure you have relevant features</a:t>
-            </a:r>
-            <a:endParaRPr/>
-          </a:p>
-          <a:p>
-            <a:pPr marL="914400" lvl="3" indent="-349250" algn="l" rtl="0">
-              <a:lnSpc>
-                <a:spcPct val="115000"/>
-              </a:lnSpc>
-              <a:spcBef>
-                <a:spcPts val="0"/>
-              </a:spcBef>
-              <a:spcAft>
-                <a:spcPts val="0"/>
-              </a:spcAft>
-              <a:buSzPts val="1900"/>
-              <a:buChar char="●"/>
-            </a:pPr>
-            <a:r>
-              <a:rPr lang="en-US"/>
-              <a:t>Imputation</a:t>
-            </a:r>
-            <a:endParaRPr/>
-          </a:p>
-          <a:p>
-            <a:pPr marL="914400" lvl="3" indent="-349250" algn="l" rtl="0">
-              <a:lnSpc>
-                <a:spcPct val="115000"/>
-              </a:lnSpc>
-              <a:spcBef>
-                <a:spcPts val="0"/>
-              </a:spcBef>
-              <a:spcAft>
-                <a:spcPts val="0"/>
-              </a:spcAft>
-              <a:buSzPts val="1900"/>
-              <a:buChar char="●"/>
-            </a:pPr>
-            <a:r>
-              <a:rPr lang="en-US"/>
-              <a:t>scaling</a:t>
-            </a:r>
-            <a:endParaRPr/>
-          </a:p>
-          <a:p>
-            <a:pPr marL="0" lvl="0" indent="0" algn="l" rtl="0">
-              <a:lnSpc>
-                <a:spcPct val="115000"/>
-              </a:lnSpc>
-              <a:spcBef>
-                <a:spcPts val="0"/>
-              </a:spcBef>
-              <a:spcAft>
-                <a:spcPts val="0"/>
-              </a:spcAft>
-              <a:buSzPts val="2400"/>
-              <a:buChar char="●"/>
-            </a:pPr>
-            <a:r>
-              <a:rPr lang="en-US"/>
-              <a:t>Models</a:t>
-            </a:r>
-            <a:endParaRPr/>
-          </a:p>
-          <a:p>
-            <a:pPr marL="914400" lvl="3" indent="-349250" algn="l" rtl="0">
-              <a:lnSpc>
-                <a:spcPct val="115000"/>
-              </a:lnSpc>
-              <a:spcBef>
-                <a:spcPts val="0"/>
-              </a:spcBef>
-              <a:spcAft>
-                <a:spcPts val="0"/>
-              </a:spcAft>
-              <a:buSzPts val="1900"/>
-              <a:buChar char="●"/>
-            </a:pPr>
-            <a:r>
-              <a:rPr lang="en-US"/>
-              <a:t>Make sure you have an appropriately large grid and model types</a:t>
-            </a:r>
-            <a:endParaRPr/>
-          </a:p>
-          <a:p>
-            <a:pPr marL="0" lvl="0" indent="0" algn="l" rtl="0">
-              <a:lnSpc>
-                <a:spcPct val="115000"/>
-              </a:lnSpc>
-              <a:spcBef>
-                <a:spcPts val="0"/>
-              </a:spcBef>
-              <a:spcAft>
-                <a:spcPts val="0"/>
-              </a:spcAft>
-              <a:buSzPts val="2400"/>
-              <a:buChar char="●"/>
-            </a:pPr>
-            <a:r>
-              <a:rPr lang="en-US"/>
-              <a:t>Model Selection</a:t>
-            </a:r>
-            <a:endParaRPr/>
-          </a:p>
-          <a:p>
-            <a:pPr marL="914400" lvl="3" indent="-349250" algn="l" rtl="0">
-              <a:lnSpc>
-                <a:spcPct val="115000"/>
-              </a:lnSpc>
-              <a:spcBef>
-                <a:spcPts val="0"/>
-              </a:spcBef>
-              <a:spcAft>
-                <a:spcPts val="0"/>
-              </a:spcAft>
-              <a:buSzPts val="1900"/>
-              <a:buChar char="●"/>
-            </a:pPr>
-            <a:r>
-              <a:rPr lang="en-US"/>
-              <a:t>Initial metric (sanity check with PR-k curve), and selection metric over time</a:t>
-            </a:r>
-            <a:endParaRPr/>
-          </a:p>
-          <a:p>
-            <a:pPr marL="0" lvl="0" indent="0" algn="l" rtl="0">
-              <a:lnSpc>
-                <a:spcPct val="115000"/>
-              </a:lnSpc>
-              <a:spcBef>
-                <a:spcPts val="0"/>
-              </a:spcBef>
-              <a:spcAft>
-                <a:spcPts val="0"/>
-              </a:spcAft>
-              <a:buSzPts val="2400"/>
-              <a:buChar char="●"/>
-            </a:pPr>
-            <a:r>
-              <a:rPr lang="en-US"/>
-              <a:t>Interpretability</a:t>
-            </a:r>
-            <a:endParaRPr/>
-          </a:p>
-          <a:p>
-            <a:pPr marL="914400" lvl="3" indent="-349250" algn="l" rtl="0">
-              <a:lnSpc>
-                <a:spcPct val="115000"/>
-              </a:lnSpc>
-              <a:spcBef>
-                <a:spcPts val="0"/>
-              </a:spcBef>
-              <a:spcAft>
-                <a:spcPts val="0"/>
-              </a:spcAft>
-              <a:buSzPts val="1900"/>
-              <a:buChar char="●"/>
-            </a:pPr>
-            <a:r>
-              <a:rPr lang="en-US"/>
-              <a:t>Feature importances, Cross-Tabs</a:t>
-            </a:r>
-            <a:endParaRPr/>
-          </a:p>
-          <a:p>
-            <a:pPr marL="0" lvl="0" indent="0" algn="l" rtl="0">
-              <a:lnSpc>
-                <a:spcPct val="115000"/>
-              </a:lnSpc>
-              <a:spcBef>
-                <a:spcPts val="0"/>
-              </a:spcBef>
-              <a:spcAft>
-                <a:spcPts val="0"/>
-              </a:spcAft>
-              <a:buSzPts val="2400"/>
-              <a:buChar char="●"/>
-            </a:pPr>
-            <a:r>
-              <a:rPr lang="en-US"/>
-              <a:t>Bias</a:t>
-            </a:r>
-            <a:endParaRPr/>
-          </a:p>
-          <a:p>
-            <a:pPr marL="914400" lvl="3" indent="-349250" algn="l" rtl="0">
-              <a:lnSpc>
-                <a:spcPct val="115000"/>
-              </a:lnSpc>
-              <a:spcBef>
-                <a:spcPts val="0"/>
-              </a:spcBef>
-              <a:spcAft>
-                <a:spcPts val="0"/>
-              </a:spcAft>
-              <a:buSzPts val="1900"/>
-              <a:buChar char="●"/>
-            </a:pPr>
-            <a:r>
-              <a:rPr lang="en-US"/>
-              <a:t>Protected Group and Bias Metric</a:t>
-            </a:r>
-            <a:endParaRPr/>
-          </a:p>
-        </p:txBody>
-      </p:sp>
-    </p:spTree>
-  </p:cSld>
-  <p:clrMapOvr>
-    <a:masterClrMapping/>
-  </p:clrMapOvr>
-</p:sld>
-</file>
-
 <file path=ppt/slides/slide7.xml><?xml version="1.0" encoding="utf-8"?>
 <p:sld xmlns:a="http://schemas.openxmlformats.org/drawingml/2006/main" xmlns:r="http://schemas.openxmlformats.org/officeDocument/2006/relationships" xmlns:p="http://schemas.openxmlformats.org/presentationml/2006/main">
   <p:cSld>

</xml_diff>